<commit_message>
Add ppt and excel file
</commit_message>
<xml_diff>
--- a/Documentation/InformationSites.pptx
+++ b/Documentation/InformationSites.pptx
@@ -6,11 +6,16 @@
   </p:sldMasterIdLst>
   <p:sldIdLst>
     <p:sldId id="256" r:id="rId2"/>
-    <p:sldId id="258" r:id="rId3"/>
-    <p:sldId id="257" r:id="rId4"/>
-    <p:sldId id="261" r:id="rId5"/>
-    <p:sldId id="259" r:id="rId6"/>
-    <p:sldId id="260" r:id="rId7"/>
+    <p:sldId id="262" r:id="rId3"/>
+    <p:sldId id="264" r:id="rId4"/>
+    <p:sldId id="265" r:id="rId5"/>
+    <p:sldId id="258" r:id="rId6"/>
+    <p:sldId id="257" r:id="rId7"/>
+    <p:sldId id="263" r:id="rId8"/>
+    <p:sldId id="261" r:id="rId9"/>
+    <p:sldId id="259" r:id="rId10"/>
+    <p:sldId id="260" r:id="rId11"/>
+    <p:sldId id="266" r:id="rId12"/>
   </p:sldIdLst>
   <p:sldSz cx="12192000" cy="6858000"/>
   <p:notesSz cx="6858000" cy="9144000"/>
@@ -266,7 +271,7 @@
           <a:p>
             <a:fld id="{A97FA60E-C3DD-4DDA-BABD-E97688BEE416}" type="datetimeFigureOut">
               <a:rPr lang="en-US" smtClean="0"/>
-              <a:t>1/26/2022</a:t>
+              <a:t>1/27/2022</a:t>
             </a:fld>
             <a:endParaRPr lang="en-US"/>
           </a:p>
@@ -466,7 +471,7 @@
           <a:p>
             <a:fld id="{A97FA60E-C3DD-4DDA-BABD-E97688BEE416}" type="datetimeFigureOut">
               <a:rPr lang="en-US" smtClean="0"/>
-              <a:t>1/26/2022</a:t>
+              <a:t>1/27/2022</a:t>
             </a:fld>
             <a:endParaRPr lang="en-US"/>
           </a:p>
@@ -676,7 +681,7 @@
           <a:p>
             <a:fld id="{A97FA60E-C3DD-4DDA-BABD-E97688BEE416}" type="datetimeFigureOut">
               <a:rPr lang="en-US" smtClean="0"/>
-              <a:t>1/26/2022</a:t>
+              <a:t>1/27/2022</a:t>
             </a:fld>
             <a:endParaRPr lang="en-US"/>
           </a:p>
@@ -876,7 +881,7 @@
           <a:p>
             <a:fld id="{A97FA60E-C3DD-4DDA-BABD-E97688BEE416}" type="datetimeFigureOut">
               <a:rPr lang="en-US" smtClean="0"/>
-              <a:t>1/26/2022</a:t>
+              <a:t>1/27/2022</a:t>
             </a:fld>
             <a:endParaRPr lang="en-US"/>
           </a:p>
@@ -1152,7 +1157,7 @@
           <a:p>
             <a:fld id="{A97FA60E-C3DD-4DDA-BABD-E97688BEE416}" type="datetimeFigureOut">
               <a:rPr lang="en-US" smtClean="0"/>
-              <a:t>1/26/2022</a:t>
+              <a:t>1/27/2022</a:t>
             </a:fld>
             <a:endParaRPr lang="en-US"/>
           </a:p>
@@ -1420,7 +1425,7 @@
           <a:p>
             <a:fld id="{A97FA60E-C3DD-4DDA-BABD-E97688BEE416}" type="datetimeFigureOut">
               <a:rPr lang="en-US" smtClean="0"/>
-              <a:t>1/26/2022</a:t>
+              <a:t>1/27/2022</a:t>
             </a:fld>
             <a:endParaRPr lang="en-US"/>
           </a:p>
@@ -1835,7 +1840,7 @@
           <a:p>
             <a:fld id="{A97FA60E-C3DD-4DDA-BABD-E97688BEE416}" type="datetimeFigureOut">
               <a:rPr lang="en-US" smtClean="0"/>
-              <a:t>1/26/2022</a:t>
+              <a:t>1/27/2022</a:t>
             </a:fld>
             <a:endParaRPr lang="en-US"/>
           </a:p>
@@ -1977,7 +1982,7 @@
           <a:p>
             <a:fld id="{A97FA60E-C3DD-4DDA-BABD-E97688BEE416}" type="datetimeFigureOut">
               <a:rPr lang="en-US" smtClean="0"/>
-              <a:t>1/26/2022</a:t>
+              <a:t>1/27/2022</a:t>
             </a:fld>
             <a:endParaRPr lang="en-US"/>
           </a:p>
@@ -2090,7 +2095,7 @@
           <a:p>
             <a:fld id="{A97FA60E-C3DD-4DDA-BABD-E97688BEE416}" type="datetimeFigureOut">
               <a:rPr lang="en-US" smtClean="0"/>
-              <a:t>1/26/2022</a:t>
+              <a:t>1/27/2022</a:t>
             </a:fld>
             <a:endParaRPr lang="en-US"/>
           </a:p>
@@ -2403,7 +2408,7 @@
           <a:p>
             <a:fld id="{A97FA60E-C3DD-4DDA-BABD-E97688BEE416}" type="datetimeFigureOut">
               <a:rPr lang="en-US" smtClean="0"/>
-              <a:t>1/26/2022</a:t>
+              <a:t>1/27/2022</a:t>
             </a:fld>
             <a:endParaRPr lang="en-US"/>
           </a:p>
@@ -2692,7 +2697,7 @@
           <a:p>
             <a:fld id="{A97FA60E-C3DD-4DDA-BABD-E97688BEE416}" type="datetimeFigureOut">
               <a:rPr lang="en-US" smtClean="0"/>
-              <a:t>1/26/2022</a:t>
+              <a:t>1/27/2022</a:t>
             </a:fld>
             <a:endParaRPr lang="en-US"/>
           </a:p>
@@ -2935,7 +2940,7 @@
           <a:p>
             <a:fld id="{A97FA60E-C3DD-4DDA-BABD-E97688BEE416}" type="datetimeFigureOut">
               <a:rPr lang="en-US" smtClean="0"/>
-              <a:t>1/26/2022</a:t>
+              <a:t>1/27/2022</a:t>
             </a:fld>
             <a:endParaRPr lang="en-US"/>
           </a:p>
@@ -3415,6 +3420,197 @@
 </p:sld>
 </file>
 
+<file path=ppt/slides/slide10.xml><?xml version="1.0" encoding="utf-8"?>
+<p:sld xmlns:a="http://schemas.openxmlformats.org/drawingml/2006/main" xmlns:r="http://schemas.openxmlformats.org/officeDocument/2006/relationships" xmlns:p="http://schemas.openxmlformats.org/presentationml/2006/main">
+  <p:cSld>
+    <p:spTree>
+      <p:nvGrpSpPr>
+        <p:cNvPr id="1" name=""/>
+        <p:cNvGrpSpPr/>
+        <p:nvPr/>
+      </p:nvGrpSpPr>
+      <p:grpSpPr>
+        <a:xfrm>
+          <a:off x="0" y="0"/>
+          <a:ext cx="0" cy="0"/>
+          <a:chOff x="0" y="0"/>
+          <a:chExt cx="0" cy="0"/>
+        </a:xfrm>
+      </p:grpSpPr>
+      <p:sp>
+        <p:nvSpPr>
+          <p:cNvPr id="2" name="Titel 1">
+            <a:extLst>
+              <a:ext uri="{FF2B5EF4-FFF2-40B4-BE49-F238E27FC236}">
+                <a16:creationId xmlns:a16="http://schemas.microsoft.com/office/drawing/2014/main" id="{24135137-19BD-4141-936E-AD1525693071}"/>
+              </a:ext>
+            </a:extLst>
+          </p:cNvPr>
+          <p:cNvSpPr>
+            <a:spLocks noGrp="1"/>
+          </p:cNvSpPr>
+          <p:nvPr>
+            <p:ph type="title"/>
+          </p:nvPr>
+        </p:nvSpPr>
+        <p:spPr/>
+        <p:txBody>
+          <a:bodyPr/>
+          <a:lstStyle/>
+          <a:p>
+            <a:r>
+              <a:rPr lang="en-US" dirty="0"/>
+              <a:t>Scrape definitions per site type</a:t>
+            </a:r>
+          </a:p>
+        </p:txBody>
+      </p:sp>
+      <p:sp>
+        <p:nvSpPr>
+          <p:cNvPr id="3" name="Tijdelijke aanduiding voor inhoud 2">
+            <a:extLst>
+              <a:ext uri="{FF2B5EF4-FFF2-40B4-BE49-F238E27FC236}">
+                <a16:creationId xmlns:a16="http://schemas.microsoft.com/office/drawing/2014/main" id="{79F29BCE-2011-4829-B4A6-CFA689AE0C0A}"/>
+              </a:ext>
+            </a:extLst>
+          </p:cNvPr>
+          <p:cNvSpPr>
+            <a:spLocks noGrp="1"/>
+          </p:cNvSpPr>
+          <p:nvPr>
+            <p:ph idx="1"/>
+          </p:nvPr>
+        </p:nvSpPr>
+        <p:spPr/>
+        <p:txBody>
+          <a:bodyPr/>
+          <a:lstStyle/>
+          <a:p>
+            <a:pPr marL="0" indent="0">
+              <a:buNone/>
+            </a:pPr>
+            <a:r>
+              <a:rPr lang="en-US" dirty="0"/>
+              <a:t>Deep</a:t>
+            </a:r>
+          </a:p>
+          <a:p>
+            <a:r>
+              <a:rPr lang="en-US" dirty="0"/>
+              <a:t>List</a:t>
+            </a:r>
+          </a:p>
+        </p:txBody>
+      </p:sp>
+    </p:spTree>
+    <p:extLst>
+      <p:ext uri="{BB962C8B-B14F-4D97-AF65-F5344CB8AC3E}">
+        <p14:creationId xmlns:p14="http://schemas.microsoft.com/office/powerpoint/2010/main" val="354898761"/>
+      </p:ext>
+    </p:extLst>
+  </p:cSld>
+  <p:clrMapOvr>
+    <a:masterClrMapping/>
+  </p:clrMapOvr>
+</p:sld>
+</file>
+
+<file path=ppt/slides/slide11.xml><?xml version="1.0" encoding="utf-8"?>
+<p:sld xmlns:a="http://schemas.openxmlformats.org/drawingml/2006/main" xmlns:r="http://schemas.openxmlformats.org/officeDocument/2006/relationships" xmlns:p="http://schemas.openxmlformats.org/presentationml/2006/main">
+  <p:cSld>
+    <p:spTree>
+      <p:nvGrpSpPr>
+        <p:cNvPr id="1" name=""/>
+        <p:cNvGrpSpPr/>
+        <p:nvPr/>
+      </p:nvGrpSpPr>
+      <p:grpSpPr>
+        <a:xfrm>
+          <a:off x="0" y="0"/>
+          <a:ext cx="0" cy="0"/>
+          <a:chOff x="0" y="0"/>
+          <a:chExt cx="0" cy="0"/>
+        </a:xfrm>
+      </p:grpSpPr>
+      <p:sp>
+        <p:nvSpPr>
+          <p:cNvPr id="2" name="Titel 1">
+            <a:extLst>
+              <a:ext uri="{FF2B5EF4-FFF2-40B4-BE49-F238E27FC236}">
+                <a16:creationId xmlns:a16="http://schemas.microsoft.com/office/drawing/2014/main" id="{38BC6329-331F-4C69-86A3-3D602277F5E2}"/>
+              </a:ext>
+            </a:extLst>
+          </p:cNvPr>
+          <p:cNvSpPr>
+            <a:spLocks noGrp="1"/>
+          </p:cNvSpPr>
+          <p:nvPr>
+            <p:ph type="title"/>
+          </p:nvPr>
+        </p:nvSpPr>
+        <p:spPr/>
+        <p:txBody>
+          <a:bodyPr/>
+          <a:lstStyle/>
+          <a:p>
+            <a:r>
+              <a:rPr lang="en-US" dirty="0"/>
+              <a:t>Data </a:t>
+            </a:r>
+            <a:r>
+              <a:rPr lang="en-US" dirty="0" err="1"/>
+              <a:t>vizualisation</a:t>
+            </a:r>
+            <a:endParaRPr lang="en-US" dirty="0"/>
+          </a:p>
+        </p:txBody>
+      </p:sp>
+      <p:sp>
+        <p:nvSpPr>
+          <p:cNvPr id="3" name="Tijdelijke aanduiding voor inhoud 2">
+            <a:extLst>
+              <a:ext uri="{FF2B5EF4-FFF2-40B4-BE49-F238E27FC236}">
+                <a16:creationId xmlns:a16="http://schemas.microsoft.com/office/drawing/2014/main" id="{9DE26117-DB29-4465-9F4A-40A7FD7450E2}"/>
+              </a:ext>
+            </a:extLst>
+          </p:cNvPr>
+          <p:cNvSpPr>
+            <a:spLocks noGrp="1"/>
+          </p:cNvSpPr>
+          <p:nvPr>
+            <p:ph idx="1"/>
+          </p:nvPr>
+        </p:nvSpPr>
+        <p:spPr/>
+        <p:txBody>
+          <a:bodyPr/>
+          <a:lstStyle/>
+          <a:p>
+            <a:r>
+              <a:rPr lang="en-US" dirty="0"/>
+              <a:t>Pandas data shown from </a:t>
+            </a:r>
+            <a:r>
+              <a:rPr lang="en-US" dirty="0" err="1"/>
+              <a:t>streamlit</a:t>
+            </a:r>
+            <a:endParaRPr lang="en-US" dirty="0"/>
+          </a:p>
+        </p:txBody>
+      </p:sp>
+    </p:spTree>
+    <p:extLst>
+      <p:ext uri="{BB962C8B-B14F-4D97-AF65-F5344CB8AC3E}">
+        <p14:creationId xmlns:p14="http://schemas.microsoft.com/office/powerpoint/2010/main" val="3767203990"/>
+      </p:ext>
+    </p:extLst>
+  </p:cSld>
+  <p:clrMapOvr>
+    <a:masterClrMapping/>
+  </p:clrMapOvr>
+</p:sld>
+</file>
+
 <file path=ppt/slides/slide2.xml><?xml version="1.0" encoding="utf-8"?>
 <p:sld xmlns:a="http://schemas.openxmlformats.org/drawingml/2006/main" xmlns:r="http://schemas.openxmlformats.org/officeDocument/2006/relationships" xmlns:p="http://schemas.openxmlformats.org/presentationml/2006/main">
   <p:cSld>
@@ -3437,6 +3633,600 @@
           <p:cNvPr id="2" name="Titel 1">
             <a:extLst>
               <a:ext uri="{FF2B5EF4-FFF2-40B4-BE49-F238E27FC236}">
+                <a16:creationId xmlns:a16="http://schemas.microsoft.com/office/drawing/2014/main" id="{748C0ACB-7DA8-490B-A493-EE885618C64A}"/>
+              </a:ext>
+            </a:extLst>
+          </p:cNvPr>
+          <p:cNvSpPr>
+            <a:spLocks noGrp="1"/>
+          </p:cNvSpPr>
+          <p:nvPr>
+            <p:ph type="title"/>
+          </p:nvPr>
+        </p:nvSpPr>
+        <p:spPr/>
+        <p:txBody>
+          <a:bodyPr/>
+          <a:lstStyle/>
+          <a:p>
+            <a:endParaRPr lang="en-US"/>
+          </a:p>
+        </p:txBody>
+      </p:sp>
+      <p:sp>
+        <p:nvSpPr>
+          <p:cNvPr id="3" name="Tijdelijke aanduiding voor inhoud 2">
+            <a:extLst>
+              <a:ext uri="{FF2B5EF4-FFF2-40B4-BE49-F238E27FC236}">
+                <a16:creationId xmlns:a16="http://schemas.microsoft.com/office/drawing/2014/main" id="{52337A9D-1420-4D4E-99A0-A3CE830D7D42}"/>
+              </a:ext>
+            </a:extLst>
+          </p:cNvPr>
+          <p:cNvSpPr>
+            <a:spLocks noGrp="1"/>
+          </p:cNvSpPr>
+          <p:nvPr>
+            <p:ph idx="1"/>
+          </p:nvPr>
+        </p:nvSpPr>
+        <p:spPr/>
+        <p:txBody>
+          <a:bodyPr/>
+          <a:lstStyle/>
+          <a:p>
+            <a:r>
+              <a:rPr lang="en-US" dirty="0"/>
+              <a:t>Robot scherm</a:t>
+            </a:r>
+          </a:p>
+          <a:p>
+            <a:pPr lvl="1"/>
+            <a:r>
+              <a:rPr lang="en-US" dirty="0"/>
+              <a:t>Put link in stack and proceed</a:t>
+            </a:r>
+            <a:br>
+              <a:rPr lang="en-US" dirty="0"/>
+            </a:br>
+            <a:r>
+              <a:rPr lang="en-US" dirty="0"/>
+              <a:t>-&gt; intermediate or before next update notification + push from queue</a:t>
+            </a:r>
+          </a:p>
+        </p:txBody>
+      </p:sp>
+    </p:spTree>
+    <p:extLst>
+      <p:ext uri="{BB962C8B-B14F-4D97-AF65-F5344CB8AC3E}">
+        <p14:creationId xmlns:p14="http://schemas.microsoft.com/office/powerpoint/2010/main" val="508267690"/>
+      </p:ext>
+    </p:extLst>
+  </p:cSld>
+  <p:clrMapOvr>
+    <a:masterClrMapping/>
+  </p:clrMapOvr>
+</p:sld>
+</file>
+
+<file path=ppt/slides/slide3.xml><?xml version="1.0" encoding="utf-8"?>
+<p:sld xmlns:a="http://schemas.openxmlformats.org/drawingml/2006/main" xmlns:r="http://schemas.openxmlformats.org/officeDocument/2006/relationships" xmlns:p="http://schemas.openxmlformats.org/presentationml/2006/main">
+  <p:cSld>
+    <p:spTree>
+      <p:nvGrpSpPr>
+        <p:cNvPr id="1" name=""/>
+        <p:cNvGrpSpPr/>
+        <p:nvPr/>
+      </p:nvGrpSpPr>
+      <p:grpSpPr>
+        <a:xfrm>
+          <a:off x="0" y="0"/>
+          <a:ext cx="0" cy="0"/>
+          <a:chOff x="0" y="0"/>
+          <a:chExt cx="0" cy="0"/>
+        </a:xfrm>
+      </p:grpSpPr>
+      <p:sp>
+        <p:nvSpPr>
+          <p:cNvPr id="2" name="Titel 1">
+            <a:extLst>
+              <a:ext uri="{FF2B5EF4-FFF2-40B4-BE49-F238E27FC236}">
+                <a16:creationId xmlns:a16="http://schemas.microsoft.com/office/drawing/2014/main" id="{B63CA34D-8BB0-48E0-BECD-74FC761E7A65}"/>
+              </a:ext>
+            </a:extLst>
+          </p:cNvPr>
+          <p:cNvSpPr>
+            <a:spLocks noGrp="1"/>
+          </p:cNvSpPr>
+          <p:nvPr>
+            <p:ph type="title"/>
+          </p:nvPr>
+        </p:nvSpPr>
+        <p:spPr/>
+        <p:txBody>
+          <a:bodyPr/>
+          <a:lstStyle/>
+          <a:p>
+            <a:r>
+              <a:rPr lang="en-US" dirty="0"/>
+              <a:t>Scraper model</a:t>
+            </a:r>
+          </a:p>
+        </p:txBody>
+      </p:sp>
+      <p:sp>
+        <p:nvSpPr>
+          <p:cNvPr id="4" name="Rechthoek: afgeronde hoeken 3">
+            <a:extLst>
+              <a:ext uri="{FF2B5EF4-FFF2-40B4-BE49-F238E27FC236}">
+                <a16:creationId xmlns:a16="http://schemas.microsoft.com/office/drawing/2014/main" id="{B1262DBB-B1B5-45C9-A41F-F95CA873B1A9}"/>
+              </a:ext>
+            </a:extLst>
+          </p:cNvPr>
+          <p:cNvSpPr/>
+          <p:nvPr/>
+        </p:nvSpPr>
+        <p:spPr>
+          <a:xfrm>
+            <a:off x="3962400" y="2581275"/>
+            <a:ext cx="4267200" cy="2781300"/>
+          </a:xfrm>
+          <a:prstGeom prst="roundRect">
+            <a:avLst/>
+          </a:prstGeom>
+        </p:spPr>
+        <p:style>
+          <a:lnRef idx="2">
+            <a:schemeClr val="accent1">
+              <a:shade val="50000"/>
+            </a:schemeClr>
+          </a:lnRef>
+          <a:fillRef idx="1">
+            <a:schemeClr val="accent1"/>
+          </a:fillRef>
+          <a:effectRef idx="0">
+            <a:schemeClr val="accent1"/>
+          </a:effectRef>
+          <a:fontRef idx="minor">
+            <a:schemeClr val="lt1"/>
+          </a:fontRef>
+        </p:style>
+        <p:txBody>
+          <a:bodyPr rtlCol="0" anchor="ctr"/>
+          <a:lstStyle/>
+          <a:p>
+            <a:pPr algn="ctr"/>
+            <a:r>
+              <a:rPr lang="en-US" dirty="0"/>
+              <a:t>Import Scraper as Sc</a:t>
+            </a:r>
+          </a:p>
+          <a:p>
+            <a:pPr algn="ctr"/>
+            <a:r>
+              <a:rPr lang="en-US" dirty="0"/>
+              <a:t>Output = </a:t>
+            </a:r>
+            <a:r>
+              <a:rPr lang="en-US" dirty="0" err="1"/>
+              <a:t>Sc.FetchData</a:t>
+            </a:r>
+            <a:r>
+              <a:rPr lang="en-US" dirty="0"/>
+              <a:t>(Input)</a:t>
+            </a:r>
+          </a:p>
+        </p:txBody>
+      </p:sp>
+      <p:sp>
+        <p:nvSpPr>
+          <p:cNvPr id="5" name="Pijl: rechts 4">
+            <a:extLst>
+              <a:ext uri="{FF2B5EF4-FFF2-40B4-BE49-F238E27FC236}">
+                <a16:creationId xmlns:a16="http://schemas.microsoft.com/office/drawing/2014/main" id="{0208BEFA-DAEF-4CD6-8625-0B90B4A92187}"/>
+              </a:ext>
+            </a:extLst>
+          </p:cNvPr>
+          <p:cNvSpPr/>
+          <p:nvPr/>
+        </p:nvSpPr>
+        <p:spPr>
+          <a:xfrm>
+            <a:off x="1866900" y="3595687"/>
+            <a:ext cx="2095500" cy="752475"/>
+          </a:xfrm>
+          <a:prstGeom prst="rightArrow">
+            <a:avLst/>
+          </a:prstGeom>
+        </p:spPr>
+        <p:style>
+          <a:lnRef idx="2">
+            <a:schemeClr val="accent1">
+              <a:shade val="50000"/>
+            </a:schemeClr>
+          </a:lnRef>
+          <a:fillRef idx="1">
+            <a:schemeClr val="accent1"/>
+          </a:fillRef>
+          <a:effectRef idx="0">
+            <a:schemeClr val="accent1"/>
+          </a:effectRef>
+          <a:fontRef idx="minor">
+            <a:schemeClr val="lt1"/>
+          </a:fontRef>
+        </p:style>
+        <p:txBody>
+          <a:bodyPr rtlCol="0" anchor="ctr"/>
+          <a:lstStyle/>
+          <a:p>
+            <a:pPr algn="ctr"/>
+            <a:endParaRPr lang="en-US"/>
+          </a:p>
+        </p:txBody>
+      </p:sp>
+      <p:sp>
+        <p:nvSpPr>
+          <p:cNvPr id="6" name="Tekstvak 5">
+            <a:extLst>
+              <a:ext uri="{FF2B5EF4-FFF2-40B4-BE49-F238E27FC236}">
+                <a16:creationId xmlns:a16="http://schemas.microsoft.com/office/drawing/2014/main" id="{2C78F03E-67B0-4A1C-8F20-58E6F26716DB}"/>
+              </a:ext>
+            </a:extLst>
+          </p:cNvPr>
+          <p:cNvSpPr txBox="1"/>
+          <p:nvPr/>
+        </p:nvSpPr>
+        <p:spPr>
+          <a:xfrm>
+            <a:off x="974060" y="3089314"/>
+            <a:ext cx="1156470" cy="369332"/>
+          </a:xfrm>
+          <a:prstGeom prst="rect">
+            <a:avLst/>
+          </a:prstGeom>
+          <a:noFill/>
+        </p:spPr>
+        <p:txBody>
+          <a:bodyPr wrap="none" rtlCol="0">
+            <a:spAutoFit/>
+          </a:bodyPr>
+          <a:lstStyle/>
+          <a:p>
+            <a:r>
+              <a:rPr lang="en-US" dirty="0"/>
+              <a:t>Driver, </a:t>
+            </a:r>
+            <a:r>
+              <a:rPr lang="en-US" dirty="0" err="1"/>
+              <a:t>url</a:t>
+            </a:r>
+            <a:r>
+              <a:rPr lang="en-US" dirty="0"/>
+              <a:t> </a:t>
+            </a:r>
+          </a:p>
+        </p:txBody>
+      </p:sp>
+      <p:sp>
+        <p:nvSpPr>
+          <p:cNvPr id="7" name="Pijl: rechts 6">
+            <a:extLst>
+              <a:ext uri="{FF2B5EF4-FFF2-40B4-BE49-F238E27FC236}">
+                <a16:creationId xmlns:a16="http://schemas.microsoft.com/office/drawing/2014/main" id="{76127C68-DC99-452D-A0DB-7FABE53490B5}"/>
+              </a:ext>
+            </a:extLst>
+          </p:cNvPr>
+          <p:cNvSpPr/>
+          <p:nvPr/>
+        </p:nvSpPr>
+        <p:spPr>
+          <a:xfrm>
+            <a:off x="8229600" y="3595686"/>
+            <a:ext cx="2095500" cy="752475"/>
+          </a:xfrm>
+          <a:prstGeom prst="rightArrow">
+            <a:avLst/>
+          </a:prstGeom>
+        </p:spPr>
+        <p:style>
+          <a:lnRef idx="2">
+            <a:schemeClr val="accent1">
+              <a:shade val="50000"/>
+            </a:schemeClr>
+          </a:lnRef>
+          <a:fillRef idx="1">
+            <a:schemeClr val="accent1"/>
+          </a:fillRef>
+          <a:effectRef idx="0">
+            <a:schemeClr val="accent1"/>
+          </a:effectRef>
+          <a:fontRef idx="minor">
+            <a:schemeClr val="lt1"/>
+          </a:fontRef>
+        </p:style>
+        <p:txBody>
+          <a:bodyPr rtlCol="0" anchor="ctr"/>
+          <a:lstStyle/>
+          <a:p>
+            <a:pPr algn="ctr"/>
+            <a:endParaRPr lang="en-US"/>
+          </a:p>
+        </p:txBody>
+      </p:sp>
+      <p:sp>
+        <p:nvSpPr>
+          <p:cNvPr id="8" name="Tekstvak 7">
+            <a:extLst>
+              <a:ext uri="{FF2B5EF4-FFF2-40B4-BE49-F238E27FC236}">
+                <a16:creationId xmlns:a16="http://schemas.microsoft.com/office/drawing/2014/main" id="{225C609A-B244-4E40-9D13-64769D0F1F0F}"/>
+              </a:ext>
+            </a:extLst>
+          </p:cNvPr>
+          <p:cNvSpPr txBox="1"/>
+          <p:nvPr/>
+        </p:nvSpPr>
+        <p:spPr>
+          <a:xfrm>
+            <a:off x="8604083" y="3077648"/>
+            <a:ext cx="3442033" cy="369332"/>
+          </a:xfrm>
+          <a:prstGeom prst="rect">
+            <a:avLst/>
+          </a:prstGeom>
+          <a:noFill/>
+        </p:spPr>
+        <p:txBody>
+          <a:bodyPr wrap="none" rtlCol="0">
+            <a:spAutoFit/>
+          </a:bodyPr>
+          <a:lstStyle/>
+          <a:p>
+            <a:r>
+              <a:rPr lang="en-US" dirty="0"/>
+              <a:t>excel file met </a:t>
+            </a:r>
+            <a:r>
+              <a:rPr lang="en-US" dirty="0" err="1"/>
+              <a:t>volgende</a:t>
+            </a:r>
+            <a:r>
+              <a:rPr lang="en-US" dirty="0"/>
+              <a:t> </a:t>
+            </a:r>
+            <a:r>
+              <a:rPr lang="en-US" dirty="0" err="1"/>
+              <a:t>kenmerken</a:t>
+            </a:r>
+            <a:endParaRPr lang="en-US" dirty="0"/>
+          </a:p>
+        </p:txBody>
+      </p:sp>
+      <p:sp>
+        <p:nvSpPr>
+          <p:cNvPr id="9" name="Tekstvak 8">
+            <a:extLst>
+              <a:ext uri="{FF2B5EF4-FFF2-40B4-BE49-F238E27FC236}">
+                <a16:creationId xmlns:a16="http://schemas.microsoft.com/office/drawing/2014/main" id="{28FDF0D5-519F-4E93-88DB-EF265B4FEC0F}"/>
+              </a:ext>
+            </a:extLst>
+          </p:cNvPr>
+          <p:cNvSpPr txBox="1"/>
+          <p:nvPr/>
+        </p:nvSpPr>
+        <p:spPr>
+          <a:xfrm>
+            <a:off x="5028977" y="4780240"/>
+            <a:ext cx="2134046" cy="369332"/>
+          </a:xfrm>
+          <a:prstGeom prst="rect">
+            <a:avLst/>
+          </a:prstGeom>
+          <a:noFill/>
+        </p:spPr>
+        <p:txBody>
+          <a:bodyPr wrap="none" rtlCol="0">
+            <a:spAutoFit/>
+          </a:bodyPr>
+          <a:lstStyle/>
+          <a:p>
+            <a:r>
+              <a:rPr lang="en-US" dirty="0"/>
+              <a:t>Roots, string formats</a:t>
+            </a:r>
+          </a:p>
+        </p:txBody>
+      </p:sp>
+      <p:pic>
+        <p:nvPicPr>
+          <p:cNvPr id="11" name="Afbeelding 10">
+            <a:extLst>
+              <a:ext uri="{FF2B5EF4-FFF2-40B4-BE49-F238E27FC236}">
+                <a16:creationId xmlns:a16="http://schemas.microsoft.com/office/drawing/2014/main" id="{0D27DF83-6177-4163-8EC2-2698FF7CF45F}"/>
+              </a:ext>
+            </a:extLst>
+          </p:cNvPr>
+          <p:cNvPicPr>
+            <a:picLocks noChangeAspect="1"/>
+          </p:cNvPicPr>
+          <p:nvPr/>
+        </p:nvPicPr>
+        <p:blipFill>
+          <a:blip r:embed="rId2"/>
+          <a:stretch>
+            <a:fillRect/>
+          </a:stretch>
+        </p:blipFill>
+        <p:spPr>
+          <a:xfrm>
+            <a:off x="6621497" y="13076"/>
+            <a:ext cx="5570503" cy="2781300"/>
+          </a:xfrm>
+          <a:prstGeom prst="rect">
+            <a:avLst/>
+          </a:prstGeom>
+        </p:spPr>
+      </p:pic>
+    </p:spTree>
+    <p:extLst>
+      <p:ext uri="{BB962C8B-B14F-4D97-AF65-F5344CB8AC3E}">
+        <p14:creationId xmlns:p14="http://schemas.microsoft.com/office/powerpoint/2010/main" val="178407830"/>
+      </p:ext>
+    </p:extLst>
+  </p:cSld>
+  <p:clrMapOvr>
+    <a:masterClrMapping/>
+  </p:clrMapOvr>
+</p:sld>
+</file>
+
+<file path=ppt/slides/slide4.xml><?xml version="1.0" encoding="utf-8"?>
+<p:sld xmlns:a="http://schemas.openxmlformats.org/drawingml/2006/main" xmlns:r="http://schemas.openxmlformats.org/officeDocument/2006/relationships" xmlns:p="http://schemas.openxmlformats.org/presentationml/2006/main">
+  <p:cSld>
+    <p:spTree>
+      <p:nvGrpSpPr>
+        <p:cNvPr id="1" name=""/>
+        <p:cNvGrpSpPr/>
+        <p:nvPr/>
+      </p:nvGrpSpPr>
+      <p:grpSpPr>
+        <a:xfrm>
+          <a:off x="0" y="0"/>
+          <a:ext cx="0" cy="0"/>
+          <a:chOff x="0" y="0"/>
+          <a:chExt cx="0" cy="0"/>
+        </a:xfrm>
+      </p:grpSpPr>
+      <p:sp>
+        <p:nvSpPr>
+          <p:cNvPr id="2" name="Titel 1">
+            <a:extLst>
+              <a:ext uri="{FF2B5EF4-FFF2-40B4-BE49-F238E27FC236}">
+                <a16:creationId xmlns:a16="http://schemas.microsoft.com/office/drawing/2014/main" id="{3D4E4CD2-7DEA-4029-A4A3-24322EB2DBBE}"/>
+              </a:ext>
+            </a:extLst>
+          </p:cNvPr>
+          <p:cNvSpPr>
+            <a:spLocks noGrp="1"/>
+          </p:cNvSpPr>
+          <p:nvPr>
+            <p:ph type="title"/>
+          </p:nvPr>
+        </p:nvSpPr>
+        <p:spPr/>
+        <p:txBody>
+          <a:bodyPr/>
+          <a:lstStyle/>
+          <a:p>
+            <a:endParaRPr lang="en-US" dirty="0"/>
+          </a:p>
+        </p:txBody>
+      </p:sp>
+      <p:sp>
+        <p:nvSpPr>
+          <p:cNvPr id="3" name="Tijdelijke aanduiding voor inhoud 2">
+            <a:extLst>
+              <a:ext uri="{FF2B5EF4-FFF2-40B4-BE49-F238E27FC236}">
+                <a16:creationId xmlns:a16="http://schemas.microsoft.com/office/drawing/2014/main" id="{0D7F6A11-EC73-4791-AD5B-DB269E467524}"/>
+              </a:ext>
+            </a:extLst>
+          </p:cNvPr>
+          <p:cNvSpPr>
+            <a:spLocks noGrp="1"/>
+          </p:cNvSpPr>
+          <p:nvPr>
+            <p:ph idx="1"/>
+          </p:nvPr>
+        </p:nvSpPr>
+        <p:spPr/>
+        <p:txBody>
+          <a:bodyPr/>
+          <a:lstStyle/>
+          <a:p>
+            <a:pPr marL="0" indent="0">
+              <a:buNone/>
+            </a:pPr>
+            <a:r>
+              <a:rPr lang="en-US" dirty="0"/>
+              <a:t>Fetch data -&gt; put into pandas </a:t>
+            </a:r>
+            <a:r>
+              <a:rPr lang="en-US" dirty="0" err="1"/>
+              <a:t>dataframe</a:t>
+            </a:r>
+            <a:endParaRPr lang="en-US" dirty="0"/>
+          </a:p>
+          <a:p>
+            <a:pPr marL="0" indent="0">
+              <a:buNone/>
+            </a:pPr>
+            <a:endParaRPr lang="en-US" dirty="0"/>
+          </a:p>
+          <a:p>
+            <a:pPr marL="0" indent="0">
+              <a:buNone/>
+            </a:pPr>
+            <a:r>
+              <a:rPr lang="en-US" dirty="0"/>
+              <a:t>	Intermediate result merged database</a:t>
+            </a:r>
+          </a:p>
+          <a:p>
+            <a:pPr marL="0" indent="0">
+              <a:buNone/>
+            </a:pPr>
+            <a:r>
+              <a:rPr lang="en-US" dirty="0"/>
+              <a:t>	final automatic updater</a:t>
+            </a:r>
+          </a:p>
+          <a:p>
+            <a:pPr marL="0" indent="0">
+              <a:buNone/>
+            </a:pPr>
+            <a:endParaRPr lang="en-US" dirty="0"/>
+          </a:p>
+          <a:p>
+            <a:pPr marL="0" indent="0">
+              <a:buNone/>
+            </a:pPr>
+            <a:endParaRPr lang="en-US" dirty="0"/>
+          </a:p>
+        </p:txBody>
+      </p:sp>
+    </p:spTree>
+    <p:extLst>
+      <p:ext uri="{BB962C8B-B14F-4D97-AF65-F5344CB8AC3E}">
+        <p14:creationId xmlns:p14="http://schemas.microsoft.com/office/powerpoint/2010/main" val="2718465948"/>
+      </p:ext>
+    </p:extLst>
+  </p:cSld>
+  <p:clrMapOvr>
+    <a:masterClrMapping/>
+  </p:clrMapOvr>
+</p:sld>
+</file>
+
+<file path=ppt/slides/slide5.xml><?xml version="1.0" encoding="utf-8"?>
+<p:sld xmlns:a="http://schemas.openxmlformats.org/drawingml/2006/main" xmlns:r="http://schemas.openxmlformats.org/officeDocument/2006/relationships" xmlns:p="http://schemas.openxmlformats.org/presentationml/2006/main">
+  <p:cSld>
+    <p:spTree>
+      <p:nvGrpSpPr>
+        <p:cNvPr id="1" name=""/>
+        <p:cNvGrpSpPr/>
+        <p:nvPr/>
+      </p:nvGrpSpPr>
+      <p:grpSpPr>
+        <a:xfrm>
+          <a:off x="0" y="0"/>
+          <a:ext cx="0" cy="0"/>
+          <a:chOff x="0" y="0"/>
+          <a:chExt cx="0" cy="0"/>
+        </a:xfrm>
+      </p:grpSpPr>
+      <p:sp>
+        <p:nvSpPr>
+          <p:cNvPr id="2" name="Titel 1">
+            <a:extLst>
+              <a:ext uri="{FF2B5EF4-FFF2-40B4-BE49-F238E27FC236}">
                 <a16:creationId xmlns:a16="http://schemas.microsoft.com/office/drawing/2014/main" id="{7C96EB54-6EA3-4F28-94E1-8647DE8D8C76}"/>
               </a:ext>
             </a:extLst>
@@ -3618,7 +4408,7 @@
 </p:sld>
 </file>
 
-<file path=ppt/slides/slide3.xml><?xml version="1.0" encoding="utf-8"?>
+<file path=ppt/slides/slide6.xml><?xml version="1.0" encoding="utf-8"?>
 <p:sld xmlns:a="http://schemas.openxmlformats.org/drawingml/2006/main" xmlns:r="http://schemas.openxmlformats.org/officeDocument/2006/relationships" xmlns:p="http://schemas.openxmlformats.org/presentationml/2006/main">
   <p:cSld>
     <p:spTree>
@@ -3777,7 +4567,112 @@
 </p:sld>
 </file>
 
-<file path=ppt/slides/slide4.xml><?xml version="1.0" encoding="utf-8"?>
+<file path=ppt/slides/slide7.xml><?xml version="1.0" encoding="utf-8"?>
+<p:sld xmlns:a="http://schemas.openxmlformats.org/drawingml/2006/main" xmlns:r="http://schemas.openxmlformats.org/officeDocument/2006/relationships" xmlns:p="http://schemas.openxmlformats.org/presentationml/2006/main">
+  <p:cSld>
+    <p:spTree>
+      <p:nvGrpSpPr>
+        <p:cNvPr id="1" name=""/>
+        <p:cNvGrpSpPr/>
+        <p:nvPr/>
+      </p:nvGrpSpPr>
+      <p:grpSpPr>
+        <a:xfrm>
+          <a:off x="0" y="0"/>
+          <a:ext cx="0" cy="0"/>
+          <a:chOff x="0" y="0"/>
+          <a:chExt cx="0" cy="0"/>
+        </a:xfrm>
+      </p:grpSpPr>
+      <p:sp>
+        <p:nvSpPr>
+          <p:cNvPr id="2" name="Titel 1">
+            <a:extLst>
+              <a:ext uri="{FF2B5EF4-FFF2-40B4-BE49-F238E27FC236}">
+                <a16:creationId xmlns:a16="http://schemas.microsoft.com/office/drawing/2014/main" id="{BD88BE44-CED3-4468-A49C-43C998BADCDE}"/>
+              </a:ext>
+            </a:extLst>
+          </p:cNvPr>
+          <p:cNvSpPr>
+            <a:spLocks noGrp="1"/>
+          </p:cNvSpPr>
+          <p:nvPr>
+            <p:ph type="title"/>
+          </p:nvPr>
+        </p:nvSpPr>
+        <p:spPr/>
+        <p:txBody>
+          <a:bodyPr/>
+          <a:lstStyle/>
+          <a:p>
+            <a:r>
+              <a:rPr lang="en-US" dirty="0"/>
+              <a:t>Site </a:t>
+            </a:r>
+            <a:r>
+              <a:rPr lang="en-US" dirty="0" err="1"/>
+              <a:t>dependancies</a:t>
+            </a:r>
+            <a:endParaRPr lang="en-US" dirty="0"/>
+          </a:p>
+        </p:txBody>
+      </p:sp>
+      <p:sp>
+        <p:nvSpPr>
+          <p:cNvPr id="3" name="Tijdelijke aanduiding voor inhoud 2">
+            <a:extLst>
+              <a:ext uri="{FF2B5EF4-FFF2-40B4-BE49-F238E27FC236}">
+                <a16:creationId xmlns:a16="http://schemas.microsoft.com/office/drawing/2014/main" id="{B0387C05-1B6B-488F-A205-05683DC7C6F8}"/>
+              </a:ext>
+            </a:extLst>
+          </p:cNvPr>
+          <p:cNvSpPr>
+            <a:spLocks noGrp="1"/>
+          </p:cNvSpPr>
+          <p:nvPr>
+            <p:ph idx="1"/>
+          </p:nvPr>
+        </p:nvSpPr>
+        <p:spPr/>
+        <p:txBody>
+          <a:bodyPr/>
+          <a:lstStyle/>
+          <a:p>
+            <a:r>
+              <a:rPr lang="en-US" dirty="0"/>
+              <a:t>URL (met filter)</a:t>
+            </a:r>
+          </a:p>
+          <a:p>
+            <a:r>
+              <a:rPr lang="en-US" dirty="0"/>
+              <a:t>Root -&gt; </a:t>
+            </a:r>
+            <a:r>
+              <a:rPr lang="en-US" dirty="0" err="1"/>
+              <a:t>itemlist</a:t>
+            </a:r>
+            <a:r>
+              <a:rPr lang="en-US" dirty="0"/>
+              <a:t> structure (classes)</a:t>
+            </a:r>
+          </a:p>
+        </p:txBody>
+      </p:sp>
+    </p:spTree>
+    <p:extLst>
+      <p:ext uri="{BB962C8B-B14F-4D97-AF65-F5344CB8AC3E}">
+        <p14:creationId xmlns:p14="http://schemas.microsoft.com/office/powerpoint/2010/main" val="4207517529"/>
+      </p:ext>
+    </p:extLst>
+  </p:cSld>
+  <p:clrMapOvr>
+    <a:masterClrMapping/>
+  </p:clrMapOvr>
+</p:sld>
+</file>
+
+<file path=ppt/slides/slide8.xml><?xml version="1.0" encoding="utf-8"?>
 <p:sld xmlns:a="http://schemas.openxmlformats.org/drawingml/2006/main" xmlns:r="http://schemas.openxmlformats.org/officeDocument/2006/relationships" xmlns:p="http://schemas.openxmlformats.org/presentationml/2006/main">
   <p:cSld>
     <p:spTree>
@@ -3990,8 +4885,8 @@
         </p:nvSpPr>
         <p:spPr>
           <a:xfrm>
-            <a:off x="1264114" y="2453248"/>
-            <a:ext cx="1769395" cy="369332"/>
+            <a:off x="1978489" y="2487232"/>
+            <a:ext cx="604140" cy="369332"/>
           </a:xfrm>
           <a:prstGeom prst="rect">
             <a:avLst/>
@@ -4006,7 +4901,7 @@
           <a:p>
             <a:r>
               <a:rPr lang="en-US" dirty="0"/>
-              <a:t>Basic data + links</a:t>
+              <a:t>links</a:t>
             </a:r>
           </a:p>
         </p:txBody>
@@ -4065,7 +4960,7 @@
         <p:spPr>
           <a:xfrm>
             <a:off x="5931763" y="2892510"/>
-            <a:ext cx="3095656" cy="369332"/>
+            <a:ext cx="3095656" cy="646331"/>
           </a:xfrm>
           <a:prstGeom prst="rect">
             <a:avLst/>
@@ -4081,6 +4976,169 @@
             <a:r>
               <a:rPr lang="en-US" dirty="0"/>
               <a:t>Site Deep Scrape (Entity pages)</a:t>
+            </a:r>
+            <a:br>
+              <a:rPr lang="en-US" dirty="0"/>
+            </a:br>
+            <a:r>
+              <a:rPr lang="en-US" dirty="0"/>
+              <a:t>	Fetch data</a:t>
+            </a:r>
+          </a:p>
+        </p:txBody>
+      </p:sp>
+      <p:cxnSp>
+        <p:nvCxnSpPr>
+          <p:cNvPr id="10" name="Rechte verbindingslijn met pijl 9">
+            <a:extLst>
+              <a:ext uri="{FF2B5EF4-FFF2-40B4-BE49-F238E27FC236}">
+                <a16:creationId xmlns:a16="http://schemas.microsoft.com/office/drawing/2014/main" id="{93A8F5CD-E249-436B-B6D5-F0C87FB4B322}"/>
+              </a:ext>
+            </a:extLst>
+          </p:cNvPr>
+          <p:cNvCxnSpPr>
+            <a:cxnSpLocks/>
+          </p:cNvCxnSpPr>
+          <p:nvPr/>
+        </p:nvCxnSpPr>
+        <p:spPr>
+          <a:xfrm flipH="1">
+            <a:off x="2734322" y="3150481"/>
+            <a:ext cx="3075928" cy="312096"/>
+          </a:xfrm>
+          <a:prstGeom prst="straightConnector1">
+            <a:avLst/>
+          </a:prstGeom>
+          <a:ln>
+            <a:tailEnd type="triangle"/>
+          </a:ln>
+        </p:spPr>
+        <p:style>
+          <a:lnRef idx="1">
+            <a:schemeClr val="dk1"/>
+          </a:lnRef>
+          <a:fillRef idx="0">
+            <a:schemeClr val="dk1"/>
+          </a:fillRef>
+          <a:effectRef idx="0">
+            <a:schemeClr val="dk1"/>
+          </a:effectRef>
+          <a:fontRef idx="minor">
+            <a:schemeClr val="tx1"/>
+          </a:fontRef>
+        </p:style>
+      </p:cxnSp>
+      <p:sp>
+        <p:nvSpPr>
+          <p:cNvPr id="15" name="Tekstvak 14">
+            <a:extLst>
+              <a:ext uri="{FF2B5EF4-FFF2-40B4-BE49-F238E27FC236}">
+                <a16:creationId xmlns:a16="http://schemas.microsoft.com/office/drawing/2014/main" id="{4274A795-B6CE-4109-9EFE-124FE751CF22}"/>
+              </a:ext>
+            </a:extLst>
+          </p:cNvPr>
+          <p:cNvSpPr txBox="1"/>
+          <p:nvPr/>
+        </p:nvSpPr>
+        <p:spPr>
+          <a:xfrm>
+            <a:off x="770417" y="3277911"/>
+            <a:ext cx="1702774" cy="369332"/>
+          </a:xfrm>
+          <a:prstGeom prst="rect">
+            <a:avLst/>
+          </a:prstGeom>
+          <a:noFill/>
+        </p:spPr>
+        <p:txBody>
+          <a:bodyPr wrap="none" rtlCol="0">
+            <a:spAutoFit/>
+          </a:bodyPr>
+          <a:lstStyle/>
+          <a:p>
+            <a:r>
+              <a:rPr lang="en-US" dirty="0"/>
+              <a:t>In pandas frame</a:t>
+            </a:r>
+          </a:p>
+        </p:txBody>
+      </p:sp>
+      <p:sp>
+        <p:nvSpPr>
+          <p:cNvPr id="16" name="Tekstvak 15">
+            <a:extLst>
+              <a:ext uri="{FF2B5EF4-FFF2-40B4-BE49-F238E27FC236}">
+                <a16:creationId xmlns:a16="http://schemas.microsoft.com/office/drawing/2014/main" id="{9D3E1A42-3D17-494B-83BE-67B21FFCB30C}"/>
+              </a:ext>
+            </a:extLst>
+          </p:cNvPr>
+          <p:cNvSpPr txBox="1"/>
+          <p:nvPr/>
+        </p:nvSpPr>
+        <p:spPr>
+          <a:xfrm>
+            <a:off x="1857628" y="4941398"/>
+            <a:ext cx="8547276" cy="1477328"/>
+          </a:xfrm>
+          <a:prstGeom prst="rect">
+            <a:avLst/>
+          </a:prstGeom>
+          <a:noFill/>
+        </p:spPr>
+        <p:txBody>
+          <a:bodyPr wrap="none" rtlCol="0">
+            <a:spAutoFit/>
+          </a:bodyPr>
+          <a:lstStyle/>
+          <a:p>
+            <a:r>
+              <a:rPr lang="en-US" dirty="0"/>
+              <a:t>Collect all panda items merge into 1 table, order on street and number (site first variable)</a:t>
+            </a:r>
+          </a:p>
+          <a:p>
+            <a:br>
+              <a:rPr lang="en-US" dirty="0"/>
+            </a:br>
+            <a:r>
+              <a:rPr lang="en-US" dirty="0"/>
+              <a:t>Site	Postal City    Street     Nr.  Price</a:t>
+            </a:r>
+          </a:p>
+          <a:p>
+            <a:r>
+              <a:rPr lang="en-US" dirty="0" err="1"/>
+              <a:t>Zimmo</a:t>
+            </a:r>
+            <a:r>
+              <a:rPr lang="en-US" dirty="0"/>
+              <a:t>	3000 Leuven </a:t>
+            </a:r>
+            <a:r>
+              <a:rPr lang="en-US" dirty="0" err="1"/>
+              <a:t>Arnould</a:t>
+            </a:r>
+            <a:r>
+              <a:rPr lang="en-US" dirty="0"/>
+              <a:t> 32 3000</a:t>
+            </a:r>
+          </a:p>
+          <a:p>
+            <a:r>
+              <a:rPr lang="en-US" dirty="0" err="1"/>
+              <a:t>Immo</a:t>
+            </a:r>
+            <a:r>
+              <a:rPr lang="en-US" dirty="0"/>
+              <a:t>-M	3000 Leuven </a:t>
+            </a:r>
+            <a:r>
+              <a:rPr lang="en-US" dirty="0" err="1"/>
+              <a:t>Arnould</a:t>
+            </a:r>
+            <a:r>
+              <a:rPr lang="en-US" dirty="0"/>
+              <a:t> 32 200</a:t>
             </a:r>
           </a:p>
         </p:txBody>
@@ -4098,7 +5156,7 @@
 </p:sld>
 </file>
 
-<file path=ppt/slides/slide5.xml><?xml version="1.0" encoding="utf-8"?>
+<file path=ppt/slides/slide9.xml><?xml version="1.0" encoding="utf-8"?>
 <p:sld xmlns:a="http://schemas.openxmlformats.org/drawingml/2006/main" xmlns:r="http://schemas.openxmlformats.org/officeDocument/2006/relationships" xmlns:p="http://schemas.openxmlformats.org/presentationml/2006/main">
   <p:cSld>
     <p:spTree>
@@ -4273,101 +5331,6 @@
     <p:extLst>
       <p:ext uri="{BB962C8B-B14F-4D97-AF65-F5344CB8AC3E}">
         <p14:creationId xmlns:p14="http://schemas.microsoft.com/office/powerpoint/2010/main" val="356264236"/>
-      </p:ext>
-    </p:extLst>
-  </p:cSld>
-  <p:clrMapOvr>
-    <a:masterClrMapping/>
-  </p:clrMapOvr>
-</p:sld>
-</file>
-
-<file path=ppt/slides/slide6.xml><?xml version="1.0" encoding="utf-8"?>
-<p:sld xmlns:a="http://schemas.openxmlformats.org/drawingml/2006/main" xmlns:r="http://schemas.openxmlformats.org/officeDocument/2006/relationships" xmlns:p="http://schemas.openxmlformats.org/presentationml/2006/main">
-  <p:cSld>
-    <p:spTree>
-      <p:nvGrpSpPr>
-        <p:cNvPr id="1" name=""/>
-        <p:cNvGrpSpPr/>
-        <p:nvPr/>
-      </p:nvGrpSpPr>
-      <p:grpSpPr>
-        <a:xfrm>
-          <a:off x="0" y="0"/>
-          <a:ext cx="0" cy="0"/>
-          <a:chOff x="0" y="0"/>
-          <a:chExt cx="0" cy="0"/>
-        </a:xfrm>
-      </p:grpSpPr>
-      <p:sp>
-        <p:nvSpPr>
-          <p:cNvPr id="2" name="Titel 1">
-            <a:extLst>
-              <a:ext uri="{FF2B5EF4-FFF2-40B4-BE49-F238E27FC236}">
-                <a16:creationId xmlns:a16="http://schemas.microsoft.com/office/drawing/2014/main" id="{24135137-19BD-4141-936E-AD1525693071}"/>
-              </a:ext>
-            </a:extLst>
-          </p:cNvPr>
-          <p:cNvSpPr>
-            <a:spLocks noGrp="1"/>
-          </p:cNvSpPr>
-          <p:nvPr>
-            <p:ph type="title"/>
-          </p:nvPr>
-        </p:nvSpPr>
-        <p:spPr/>
-        <p:txBody>
-          <a:bodyPr/>
-          <a:lstStyle/>
-          <a:p>
-            <a:r>
-              <a:rPr lang="en-US" dirty="0"/>
-              <a:t>Scrape definitions per site type</a:t>
-            </a:r>
-          </a:p>
-        </p:txBody>
-      </p:sp>
-      <p:sp>
-        <p:nvSpPr>
-          <p:cNvPr id="3" name="Tijdelijke aanduiding voor inhoud 2">
-            <a:extLst>
-              <a:ext uri="{FF2B5EF4-FFF2-40B4-BE49-F238E27FC236}">
-                <a16:creationId xmlns:a16="http://schemas.microsoft.com/office/drawing/2014/main" id="{79F29BCE-2011-4829-B4A6-CFA689AE0C0A}"/>
-              </a:ext>
-            </a:extLst>
-          </p:cNvPr>
-          <p:cNvSpPr>
-            <a:spLocks noGrp="1"/>
-          </p:cNvSpPr>
-          <p:nvPr>
-            <p:ph idx="1"/>
-          </p:nvPr>
-        </p:nvSpPr>
-        <p:spPr/>
-        <p:txBody>
-          <a:bodyPr/>
-          <a:lstStyle/>
-          <a:p>
-            <a:pPr marL="0" indent="0">
-              <a:buNone/>
-            </a:pPr>
-            <a:r>
-              <a:rPr lang="en-US" dirty="0"/>
-              <a:t>Deep</a:t>
-            </a:r>
-          </a:p>
-          <a:p>
-            <a:r>
-              <a:rPr lang="en-US" dirty="0"/>
-              <a:t>List</a:t>
-            </a:r>
-          </a:p>
-        </p:txBody>
-      </p:sp>
-    </p:spTree>
-    <p:extLst>
-      <p:ext uri="{BB962C8B-B14F-4D97-AF65-F5344CB8AC3E}">
-        <p14:creationId xmlns:p14="http://schemas.microsoft.com/office/powerpoint/2010/main" val="354898761"/>
       </p:ext>
     </p:extLst>
   </p:cSld>

</xml_diff>